<commit_message>
Added my contribution slide
</commit_message>
<xml_diff>
--- a/Documentation/Group 27 BETTer Project.pptx
+++ b/Documentation/Group 27 BETTer Project.pptx
@@ -19,6 +19,7 @@
     <p:sldId id="267" r:id="rId13"/>
     <p:sldId id="268" r:id="rId14"/>
     <p:sldId id="269" r:id="rId15"/>
+    <p:sldId id="270" r:id="rId16"/>
   </p:sldIdLst>
   <p:sldSz cx="12192000" cy="6858000"/>
   <p:notesSz cx="6858000" cy="9144000"/>
@@ -627,7 +628,7 @@
           <a:p>
             <a:fld id="{EA0C0817-A112-4847-8014-A94B7D2A4EA3}" type="datetime1">
               <a:rPr lang="en-US" smtClean="0"/>
-              <a:t>3/18/2020</a:t>
+              <a:t>3/19/20</a:t>
             </a:fld>
             <a:endParaRPr lang="en-US" dirty="0"/>
           </a:p>
@@ -923,7 +924,7 @@
           <a:p>
             <a:fld id="{F6FA2B21-3FCD-4721-B95C-427943F61125}" type="datetime1">
               <a:rPr lang="en-US" smtClean="0"/>
-              <a:t>3/18/2020</a:t>
+              <a:t>3/19/20</a:t>
             </a:fld>
             <a:endParaRPr lang="en-US"/>
           </a:p>
@@ -1172,7 +1173,7 @@
           <a:p>
             <a:fld id="{F6FA2B21-3FCD-4721-B95C-427943F61125}" type="datetime1">
               <a:rPr lang="en-US" smtClean="0"/>
-              <a:t>3/18/2020</a:t>
+              <a:t>3/19/20</a:t>
             </a:fld>
             <a:endParaRPr lang="en-US"/>
           </a:p>
@@ -1713,7 +1714,7 @@
           <a:p>
             <a:fld id="{F6FA2B21-3FCD-4721-B95C-427943F61125}" type="datetime1">
               <a:rPr lang="en-US" smtClean="0"/>
-              <a:t>3/18/2020</a:t>
+              <a:t>3/19/20</a:t>
             </a:fld>
             <a:endParaRPr lang="en-US"/>
           </a:p>
@@ -1962,7 +1963,7 @@
           <a:p>
             <a:fld id="{F6FA2B21-3FCD-4721-B95C-427943F61125}" type="datetime1">
               <a:rPr lang="en-US" smtClean="0"/>
-              <a:t>3/18/2020</a:t>
+              <a:t>3/19/20</a:t>
             </a:fld>
             <a:endParaRPr lang="en-US"/>
           </a:p>
@@ -2495,7 +2496,7 @@
           <a:p>
             <a:fld id="{F6FA2B21-3FCD-4721-B95C-427943F61125}" type="datetime1">
               <a:rPr lang="en-US" smtClean="0"/>
-              <a:t>3/18/2020</a:t>
+              <a:t>3/19/20</a:t>
             </a:fld>
             <a:endParaRPr lang="en-US"/>
           </a:p>
@@ -2793,7 +2794,7 @@
           <a:p>
             <a:fld id="{F6FA2B21-3FCD-4721-B95C-427943F61125}" type="datetime1">
               <a:rPr lang="en-US" smtClean="0"/>
-              <a:t>3/18/2020</a:t>
+              <a:t>3/19/20</a:t>
             </a:fld>
             <a:endParaRPr lang="en-US"/>
           </a:p>
@@ -2968,7 +2969,7 @@
           <a:p>
             <a:fld id="{134F40B7-36AB-4376-BE14-EF7004D79BB9}" type="datetime1">
               <a:rPr lang="en-US" smtClean="0"/>
-              <a:t>3/18/2020</a:t>
+              <a:t>3/19/20</a:t>
             </a:fld>
             <a:endParaRPr lang="en-US"/>
           </a:p>
@@ -3148,7 +3149,7 @@
           <a:p>
             <a:fld id="{FF87CAB8-DCAE-46A5-AADA-B3FAD11A54E0}" type="datetime1">
               <a:rPr lang="en-US" smtClean="0"/>
-              <a:t>3/18/2020</a:t>
+              <a:t>3/19/20</a:t>
             </a:fld>
             <a:endParaRPr lang="en-US"/>
           </a:p>
@@ -3318,7 +3319,7 @@
           <a:p>
             <a:fld id="{7332B432-ACDA-4023-A761-2BAB76577B62}" type="datetime1">
               <a:rPr lang="en-US" smtClean="0"/>
-              <a:t>3/18/2020</a:t>
+              <a:t>3/19/20</a:t>
             </a:fld>
             <a:endParaRPr lang="en-US"/>
           </a:p>
@@ -3569,7 +3570,7 @@
           <a:p>
             <a:fld id="{D9C646AA-F36E-4540-911D-FFFC0A0EF24A}" type="datetime1">
               <a:rPr lang="en-US" smtClean="0"/>
-              <a:t>3/18/2020</a:t>
+              <a:t>3/19/20</a:t>
             </a:fld>
             <a:endParaRPr lang="en-US" dirty="0"/>
           </a:p>
@@ -3866,7 +3867,7 @@
           <a:p>
             <a:fld id="{69186D26-FA5F-4637-B602-B7C2DC34CFD4}" type="datetime1">
               <a:rPr lang="en-US" smtClean="0"/>
-              <a:t>3/18/2020</a:t>
+              <a:t>3/19/20</a:t>
             </a:fld>
             <a:endParaRPr lang="en-US"/>
           </a:p>
@@ -4308,7 +4309,7 @@
           <a:p>
             <a:fld id="{8A7F15D8-96D1-4781-BC50-CA8A088B2FE4}" type="datetime1">
               <a:rPr lang="en-US" smtClean="0"/>
-              <a:t>3/18/2020</a:t>
+              <a:t>3/19/20</a:t>
             </a:fld>
             <a:endParaRPr lang="en-US"/>
           </a:p>
@@ -4426,7 +4427,7 @@
           <a:p>
             <a:fld id="{F9A96C99-B8F8-4528-BD05-0E16E943DC09}" type="datetime1">
               <a:rPr lang="en-US" smtClean="0"/>
-              <a:t>3/18/2020</a:t>
+              <a:t>3/19/20</a:t>
             </a:fld>
             <a:endParaRPr lang="en-US"/>
           </a:p>
@@ -4521,7 +4522,7 @@
           <a:p>
             <a:fld id="{03636942-C211-4B28-8DBD-C953E00AF71B}" type="datetime1">
               <a:rPr lang="en-US" smtClean="0"/>
-              <a:t>3/18/2020</a:t>
+              <a:t>3/19/20</a:t>
             </a:fld>
             <a:endParaRPr lang="en-US"/>
           </a:p>
@@ -4804,7 +4805,7 @@
           <a:p>
             <a:fld id="{7E8D12A6-918A-48BD-8CB9-CA713993B0EA}" type="datetime1">
               <a:rPr lang="en-US" smtClean="0"/>
-              <a:t>3/18/2020</a:t>
+              <a:t>3/19/20</a:t>
             </a:fld>
             <a:endParaRPr lang="en-US"/>
           </a:p>
@@ -5096,7 +5097,7 @@
             <a:fld id="{E778CE86-875F-4587-BCF6-FA054AFC0D53}" type="datetime1">
               <a:rPr lang="en-US" smtClean="0"/>
               <a:pPr/>
-              <a:t>3/18/2020</a:t>
+              <a:t>3/19/20</a:t>
             </a:fld>
             <a:endParaRPr lang="en-US" dirty="0"/>
           </a:p>
@@ -5627,7 +5628,7 @@
           <a:p>
             <a:fld id="{F6FA2B21-3FCD-4721-B95C-427943F61125}" type="datetime1">
               <a:rPr lang="en-US" smtClean="0"/>
-              <a:t>3/18/2020</a:t>
+              <a:t>3/19/20</a:t>
             </a:fld>
             <a:endParaRPr lang="en-US"/>
           </a:p>
@@ -6708,8 +6709,24 @@
               </a:spcAft>
             </a:pPr>
             <a:r>
-              <a:rPr lang="en-GB"/>
-              <a:t>By Franco, Pruthvi, Anas, Anthony, Romi, Cameron, Philipe  </a:t>
+              <a:rPr lang="en-GB" dirty="0"/>
+              <a:t>By Franco, </a:t>
+            </a:r>
+            <a:r>
+              <a:rPr lang="en-GB" dirty="0" err="1"/>
+              <a:t>Pruthvi</a:t>
+            </a:r>
+            <a:r>
+              <a:rPr lang="en-GB" dirty="0"/>
+              <a:t>, Anas, Anthony, </a:t>
+            </a:r>
+            <a:r>
+              <a:rPr lang="en-GB" dirty="0" err="1"/>
+              <a:t>Romi</a:t>
+            </a:r>
+            <a:r>
+              <a:rPr lang="en-GB" dirty="0"/>
+              <a:t>, Cameron, Felipe  </a:t>
             </a:r>
           </a:p>
         </p:txBody>
@@ -7414,6 +7431,105 @@
     <p:extLst>
       <p:ext uri="{BB962C8B-B14F-4D97-AF65-F5344CB8AC3E}">
         <p14:creationId xmlns:p14="http://schemas.microsoft.com/office/powerpoint/2010/main" val="3627166353"/>
+      </p:ext>
+    </p:extLst>
+  </p:cSld>
+  <p:clrMapOvr>
+    <a:masterClrMapping/>
+  </p:clrMapOvr>
+</p:sld>
+</file>
+
+<file path=ppt/slides/slide15.xml><?xml version="1.0" encoding="utf-8"?>
+<p:sld xmlns:a="http://schemas.openxmlformats.org/drawingml/2006/main" xmlns:r="http://schemas.openxmlformats.org/officeDocument/2006/relationships" xmlns:p="http://schemas.openxmlformats.org/presentationml/2006/main">
+  <p:cSld>
+    <p:spTree>
+      <p:nvGrpSpPr>
+        <p:cNvPr id="1" name=""/>
+        <p:cNvGrpSpPr/>
+        <p:nvPr/>
+      </p:nvGrpSpPr>
+      <p:grpSpPr>
+        <a:xfrm>
+          <a:off x="0" y="0"/>
+          <a:ext cx="0" cy="0"/>
+          <a:chOff x="0" y="0"/>
+          <a:chExt cx="0" cy="0"/>
+        </a:xfrm>
+      </p:grpSpPr>
+      <p:sp>
+        <p:nvSpPr>
+          <p:cNvPr id="2" name="Title 1">
+            <a:extLst>
+              <a:ext uri="{FF2B5EF4-FFF2-40B4-BE49-F238E27FC236}">
+                <a16:creationId xmlns:a16="http://schemas.microsoft.com/office/drawing/2014/main" id="{4DB3B1D1-38CD-B04D-90AB-6FF09EB4513E}"/>
+              </a:ext>
+            </a:extLst>
+          </p:cNvPr>
+          <p:cNvSpPr>
+            <a:spLocks noGrp="1"/>
+          </p:cNvSpPr>
+          <p:nvPr>
+            <p:ph type="title"/>
+          </p:nvPr>
+        </p:nvSpPr>
+        <p:spPr/>
+        <p:txBody>
+          <a:bodyPr/>
+          <a:lstStyle/>
+          <a:p>
+            <a:r>
+              <a:rPr lang="en-GB" dirty="0"/>
+              <a:t>Felipe Cardoso - Contributions</a:t>
+            </a:r>
+            <a:endParaRPr lang="en-US" dirty="0"/>
+          </a:p>
+        </p:txBody>
+      </p:sp>
+      <p:sp>
+        <p:nvSpPr>
+          <p:cNvPr id="3" name="Content Placeholder 2">
+            <a:extLst>
+              <a:ext uri="{FF2B5EF4-FFF2-40B4-BE49-F238E27FC236}">
+                <a16:creationId xmlns:a16="http://schemas.microsoft.com/office/drawing/2014/main" id="{D7B8B550-7412-9F4E-BF4D-500C6F52CE96}"/>
+              </a:ext>
+            </a:extLst>
+          </p:cNvPr>
+          <p:cNvSpPr>
+            <a:spLocks noGrp="1"/>
+          </p:cNvSpPr>
+          <p:nvPr>
+            <p:ph idx="1"/>
+          </p:nvPr>
+        </p:nvSpPr>
+        <p:spPr/>
+        <p:txBody>
+          <a:bodyPr/>
+          <a:lstStyle/>
+          <a:p>
+            <a:r>
+              <a:rPr lang="en-US" dirty="0"/>
+              <a:t>Terms and Conditions for the app</a:t>
+            </a:r>
+          </a:p>
+          <a:p>
+            <a:r>
+              <a:rPr lang="en-US" dirty="0"/>
+              <a:t>Questionnaire for the extra features</a:t>
+            </a:r>
+          </a:p>
+          <a:p>
+            <a:r>
+              <a:rPr lang="en-US" dirty="0"/>
+              <a:t>Tried to do forgotten password</a:t>
+            </a:r>
+          </a:p>
+        </p:txBody>
+      </p:sp>
+    </p:spTree>
+    <p:extLst>
+      <p:ext uri="{BB962C8B-B14F-4D97-AF65-F5344CB8AC3E}">
+        <p14:creationId xmlns:p14="http://schemas.microsoft.com/office/powerpoint/2010/main" val="50700724"/>
       </p:ext>
     </p:extLst>
   </p:cSld>

</xml_diff>

<commit_message>
Pruthvi's Contribution Slide Added
</commit_message>
<xml_diff>
--- a/Documentation/Group 27 BETTer Project.pptx
+++ b/Documentation/Group 27 BETTer Project.pptx
@@ -21,6 +21,7 @@
     <p:sldId id="269" r:id="rId15"/>
     <p:sldId id="271" r:id="rId16"/>
     <p:sldId id="270" r:id="rId17"/>
+    <p:sldId id="272" r:id="rId18"/>
   </p:sldIdLst>
   <p:sldSz cx="12192000" cy="6858000"/>
   <p:notesSz cx="6858000" cy="9144000"/>
@@ -6711,15 +6712,7 @@
             </a:pPr>
             <a:r>
               <a:rPr lang="en-GB" dirty="0"/>
-              <a:t>By Franco, </a:t>
-            </a:r>
-            <a:r>
-              <a:rPr lang="en-GB" dirty="0" err="1"/>
-              <a:t>Pruthvi</a:t>
-            </a:r>
-            <a:r>
-              <a:rPr lang="en-GB" dirty="0"/>
-              <a:t>, Anas, Anthony, </a:t>
+              <a:t>By Franco, Pruthvi, Anas, Anthony, </a:t>
             </a:r>
             <a:r>
               <a:rPr lang="en-GB" dirty="0" err="1"/>
@@ -6727,7 +6720,7 @@
             </a:r>
             <a:r>
               <a:rPr lang="en-GB" dirty="0"/>
-              <a:t>, Cameron, Felipe  </a:t>
+              <a:t>, Camron, Felipe  </a:t>
             </a:r>
           </a:p>
         </p:txBody>
@@ -7623,6 +7616,221 @@
     <p:extLst>
       <p:ext uri="{BB962C8B-B14F-4D97-AF65-F5344CB8AC3E}">
         <p14:creationId xmlns:p14="http://schemas.microsoft.com/office/powerpoint/2010/main" val="50700724"/>
+      </p:ext>
+    </p:extLst>
+  </p:cSld>
+  <p:clrMapOvr>
+    <a:masterClrMapping/>
+  </p:clrMapOvr>
+</p:sld>
+</file>
+
+<file path=ppt/slides/slide17.xml><?xml version="1.0" encoding="utf-8"?>
+<p:sld xmlns:a="http://schemas.openxmlformats.org/drawingml/2006/main" xmlns:r="http://schemas.openxmlformats.org/officeDocument/2006/relationships" xmlns:p="http://schemas.openxmlformats.org/presentationml/2006/main">
+  <p:cSld>
+    <p:spTree>
+      <p:nvGrpSpPr>
+        <p:cNvPr id="1" name=""/>
+        <p:cNvGrpSpPr/>
+        <p:nvPr/>
+      </p:nvGrpSpPr>
+      <p:grpSpPr>
+        <a:xfrm>
+          <a:off x="0" y="0"/>
+          <a:ext cx="0" cy="0"/>
+          <a:chOff x="0" y="0"/>
+          <a:chExt cx="0" cy="0"/>
+        </a:xfrm>
+      </p:grpSpPr>
+      <p:sp>
+        <p:nvSpPr>
+          <p:cNvPr id="3" name="Content Placeholder 2">
+            <a:extLst>
+              <a:ext uri="{FF2B5EF4-FFF2-40B4-BE49-F238E27FC236}">
+                <a16:creationId xmlns:a16="http://schemas.microsoft.com/office/drawing/2014/main" id="{42C43351-1F65-4C2D-B695-9AD1B2D55566}"/>
+              </a:ext>
+            </a:extLst>
+          </p:cNvPr>
+          <p:cNvSpPr>
+            <a:spLocks noGrp="1"/>
+          </p:cNvSpPr>
+          <p:nvPr>
+            <p:ph idx="1"/>
+          </p:nvPr>
+        </p:nvSpPr>
+        <p:spPr/>
+        <p:txBody>
+          <a:bodyPr>
+            <a:normAutofit fontScale="85000" lnSpcReduction="20000"/>
+          </a:bodyPr>
+          <a:lstStyle/>
+          <a:p>
+            <a:r>
+              <a:rPr lang="en-GB" dirty="0"/>
+              <a:t>Created Backend of the app</a:t>
+            </a:r>
+          </a:p>
+          <a:p>
+            <a:r>
+              <a:rPr lang="en-GB" dirty="0"/>
+              <a:t>Scraped data for the database</a:t>
+            </a:r>
+          </a:p>
+          <a:p>
+            <a:r>
+              <a:rPr lang="en-GB" dirty="0"/>
+              <a:t>Design the Database UML Diagram</a:t>
+            </a:r>
+          </a:p>
+          <a:p>
+            <a:r>
+              <a:rPr lang="en-GB" dirty="0"/>
+              <a:t>Database created for storing timetables info and user info</a:t>
+            </a:r>
+          </a:p>
+          <a:p>
+            <a:r>
+              <a:rPr lang="en-GB" dirty="0"/>
+              <a:t>Coded implementation of database (timetable and user login)</a:t>
+            </a:r>
+          </a:p>
+          <a:p>
+            <a:r>
+              <a:rPr lang="en-GB" dirty="0"/>
+              <a:t>Designed leaflet for marketing</a:t>
+            </a:r>
+          </a:p>
+          <a:p>
+            <a:r>
+              <a:rPr lang="en-GB" dirty="0"/>
+              <a:t>Testing of the App</a:t>
+            </a:r>
+          </a:p>
+          <a:p>
+            <a:r>
+              <a:rPr lang="en-GB" dirty="0"/>
+              <a:t>App suggestion were made</a:t>
+            </a:r>
+          </a:p>
+        </p:txBody>
+      </p:sp>
+      <p:sp>
+        <p:nvSpPr>
+          <p:cNvPr id="4" name="Title 1">
+            <a:extLst>
+              <a:ext uri="{FF2B5EF4-FFF2-40B4-BE49-F238E27FC236}">
+                <a16:creationId xmlns:a16="http://schemas.microsoft.com/office/drawing/2014/main" id="{D162523B-5FC2-4520-90FA-3C6CDFCE285B}"/>
+              </a:ext>
+            </a:extLst>
+          </p:cNvPr>
+          <p:cNvSpPr txBox="1">
+            <a:spLocks/>
+          </p:cNvSpPr>
+          <p:nvPr/>
+        </p:nvSpPr>
+        <p:spPr>
+          <a:xfrm>
+            <a:off x="1636711" y="838200"/>
+            <a:ext cx="10018713" cy="1752599"/>
+          </a:xfrm>
+          <a:prstGeom prst="rect">
+            <a:avLst/>
+          </a:prstGeom>
+          <a:effectLst/>
+        </p:spPr>
+        <p:txBody>
+          <a:bodyPr vert="horz" lIns="91440" tIns="45720" rIns="91440" bIns="45720" rtlCol="0" anchor="ctr">
+            <a:normAutofit/>
+          </a:bodyPr>
+          <a:lstStyle>
+            <a:lvl1pPr algn="ctr" defTabSz="457200" rtl="0" eaLnBrk="1" latinLnBrk="0" hangingPunct="1">
+              <a:spcBef>
+                <a:spcPct val="0"/>
+              </a:spcBef>
+              <a:buNone/>
+              <a:defRPr sz="4000" kern="1200" cap="none">
+                <a:ln w="3175" cmpd="sng">
+                  <a:noFill/>
+                </a:ln>
+                <a:solidFill>
+                  <a:schemeClr val="tx1"/>
+                </a:solidFill>
+                <a:effectLst/>
+                <a:latin typeface="+mj-lt"/>
+                <a:ea typeface="+mj-ea"/>
+                <a:cs typeface="+mj-cs"/>
+              </a:defRPr>
+            </a:lvl1pPr>
+            <a:lvl2pPr eaLnBrk="1" hangingPunct="1">
+              <a:defRPr>
+                <a:solidFill>
+                  <a:schemeClr val="tx2"/>
+                </a:solidFill>
+              </a:defRPr>
+            </a:lvl2pPr>
+            <a:lvl3pPr eaLnBrk="1" hangingPunct="1">
+              <a:defRPr>
+                <a:solidFill>
+                  <a:schemeClr val="tx2"/>
+                </a:solidFill>
+              </a:defRPr>
+            </a:lvl3pPr>
+            <a:lvl4pPr eaLnBrk="1" hangingPunct="1">
+              <a:defRPr>
+                <a:solidFill>
+                  <a:schemeClr val="tx2"/>
+                </a:solidFill>
+              </a:defRPr>
+            </a:lvl4pPr>
+            <a:lvl5pPr eaLnBrk="1" hangingPunct="1">
+              <a:defRPr>
+                <a:solidFill>
+                  <a:schemeClr val="tx2"/>
+                </a:solidFill>
+              </a:defRPr>
+            </a:lvl5pPr>
+            <a:lvl6pPr eaLnBrk="1" hangingPunct="1">
+              <a:defRPr>
+                <a:solidFill>
+                  <a:schemeClr val="tx2"/>
+                </a:solidFill>
+              </a:defRPr>
+            </a:lvl6pPr>
+            <a:lvl7pPr eaLnBrk="1" hangingPunct="1">
+              <a:defRPr>
+                <a:solidFill>
+                  <a:schemeClr val="tx2"/>
+                </a:solidFill>
+              </a:defRPr>
+            </a:lvl7pPr>
+            <a:lvl8pPr eaLnBrk="1" hangingPunct="1">
+              <a:defRPr>
+                <a:solidFill>
+                  <a:schemeClr val="tx2"/>
+                </a:solidFill>
+              </a:defRPr>
+            </a:lvl8pPr>
+            <a:lvl9pPr eaLnBrk="1" hangingPunct="1">
+              <a:defRPr>
+                <a:solidFill>
+                  <a:schemeClr val="tx2"/>
+                </a:solidFill>
+              </a:defRPr>
+            </a:lvl9pPr>
+          </a:lstStyle>
+          <a:p>
+            <a:r>
+              <a:rPr lang="en-GB" dirty="0"/>
+              <a:t>Pruthvi Lalji - Contributions</a:t>
+            </a:r>
+            <a:endParaRPr lang="en-US" dirty="0"/>
+          </a:p>
+        </p:txBody>
+      </p:sp>
+    </p:spTree>
+    <p:extLst>
+      <p:ext uri="{BB962C8B-B14F-4D97-AF65-F5344CB8AC3E}">
+        <p14:creationId xmlns:p14="http://schemas.microsoft.com/office/powerpoint/2010/main" val="2108857020"/>
       </p:ext>
     </p:extLst>
   </p:cSld>

</xml_diff>